<commit_message>
Adding slides and lecture code
</commit_message>
<xml_diff>
--- a/slides/Week1_1.pptx
+++ b/slides/Week1_1.pptx
@@ -5,7 +5,7 @@
     <p:sldMasterId id="2147483660" r:id="rId1"/>
   </p:sldMasterIdLst>
   <p:notesMasterIdLst>
-    <p:notesMasterId r:id="rId18"/>
+    <p:notesMasterId r:id="rId17"/>
   </p:notesMasterIdLst>
   <p:sldIdLst>
     <p:sldId id="256" r:id="rId2"/>
@@ -22,8 +22,7 @@
     <p:sldId id="259" r:id="rId13"/>
     <p:sldId id="268" r:id="rId14"/>
     <p:sldId id="267" r:id="rId15"/>
-    <p:sldId id="270" r:id="rId16"/>
-    <p:sldId id="269" r:id="rId17"/>
+    <p:sldId id="269" r:id="rId16"/>
   </p:sldIdLst>
   <p:sldSz cx="12192000" cy="6858000"/>
   <p:notesSz cx="6858000" cy="9144000"/>
@@ -133,11 +132,138 @@
 <file path=ppt/revisionInfo.xml><?xml version="1.0" encoding="utf-8"?>
 <p1510:revInfo xmlns:a="http://schemas.openxmlformats.org/drawingml/2006/main" xmlns:r="http://schemas.openxmlformats.org/officeDocument/2006/relationships" xmlns:p1510="http://schemas.microsoft.com/office/powerpoint/2015/10/main">
   <p1510:revLst>
-    <p1510:client id="{234CD593-453E-49E6-85A2-65A3248B88B6}" v="397" dt="2024-01-07T00:23:06.803"/>
-    <p1510:client id="{36ED4E1D-FB04-437C-8277-079452DF629C}" v="308" dt="2024-01-06T20:42:00.517"/>
-    <p1510:client id="{6D2F3CD6-9E0F-8CC2-8FA0-8C82247A4BDD}" v="95" dt="2024-01-09T20:51:14.478"/>
+    <p1510:client id="{E0C0FC26-AC95-4CE0-9505-FF80D35904F0}" v="1" dt="2024-05-08T13:49:58.549"/>
   </p1510:revLst>
 </p1510:revInfo>
+</file>
+
+<file path=ppt/changesInfos/changesInfo1.xml><?xml version="1.0" encoding="utf-8"?>
+<pc:chgInfo xmlns:a="http://schemas.openxmlformats.org/drawingml/2006/main" xmlns:r="http://schemas.openxmlformats.org/officeDocument/2006/relationships" xmlns:ac="http://schemas.microsoft.com/office/drawing/2013/main/command" xmlns:pc="http://schemas.microsoft.com/office/powerpoint/2013/main/command">
+  <pc:docChgLst>
+    <pc:chgData name="Arnamoy Bhattacharyya" userId="0970db85b6afed2b" providerId="LiveId" clId="{E0C0FC26-AC95-4CE0-9505-FF80D35904F0}"/>
+    <pc:docChg chg="custSel delSld modSld">
+      <pc:chgData name="Arnamoy Bhattacharyya" userId="0970db85b6afed2b" providerId="LiveId" clId="{E0C0FC26-AC95-4CE0-9505-FF80D35904F0}" dt="2024-05-10T11:51:15.250" v="419" actId="20577"/>
+      <pc:docMkLst>
+        <pc:docMk/>
+      </pc:docMkLst>
+      <pc:sldChg chg="modSp mod">
+        <pc:chgData name="Arnamoy Bhattacharyya" userId="0970db85b6afed2b" providerId="LiveId" clId="{E0C0FC26-AC95-4CE0-9505-FF80D35904F0}" dt="2024-05-08T13:38:46.074" v="3" actId="20577"/>
+        <pc:sldMkLst>
+          <pc:docMk/>
+          <pc:sldMk cId="1022045341" sldId="256"/>
+        </pc:sldMkLst>
+        <pc:spChg chg="mod">
+          <ac:chgData name="Arnamoy Bhattacharyya" userId="0970db85b6afed2b" providerId="LiveId" clId="{E0C0FC26-AC95-4CE0-9505-FF80D35904F0}" dt="2024-05-08T13:38:46.074" v="3" actId="20577"/>
+          <ac:spMkLst>
+            <pc:docMk/>
+            <pc:sldMk cId="1022045341" sldId="256"/>
+            <ac:spMk id="2" creationId="{AE114336-14BC-DE71-5374-ADD41F3D2F6B}"/>
+          </ac:spMkLst>
+        </pc:spChg>
+      </pc:sldChg>
+      <pc:sldChg chg="addSp modSp mod">
+        <pc:chgData name="Arnamoy Bhattacharyya" userId="0970db85b6afed2b" providerId="LiveId" clId="{E0C0FC26-AC95-4CE0-9505-FF80D35904F0}" dt="2024-05-08T13:52:30.115" v="304" actId="20577"/>
+        <pc:sldMkLst>
+          <pc:docMk/>
+          <pc:sldMk cId="932916590" sldId="266"/>
+        </pc:sldMkLst>
+        <pc:spChg chg="mod">
+          <ac:chgData name="Arnamoy Bhattacharyya" userId="0970db85b6afed2b" providerId="LiveId" clId="{E0C0FC26-AC95-4CE0-9505-FF80D35904F0}" dt="2024-05-08T13:48:55.515" v="18" actId="20577"/>
+          <ac:spMkLst>
+            <pc:docMk/>
+            <pc:sldMk cId="932916590" sldId="266"/>
+            <ac:spMk id="2" creationId="{54490E39-34AE-17EF-F85C-4D186A0D197E}"/>
+          </ac:spMkLst>
+        </pc:spChg>
+        <pc:spChg chg="mod">
+          <ac:chgData name="Arnamoy Bhattacharyya" userId="0970db85b6afed2b" providerId="LiveId" clId="{E0C0FC26-AC95-4CE0-9505-FF80D35904F0}" dt="2024-05-08T13:49:48.701" v="22" actId="14100"/>
+          <ac:spMkLst>
+            <pc:docMk/>
+            <pc:sldMk cId="932916590" sldId="266"/>
+            <ac:spMk id="3" creationId="{380E15B2-5026-67A9-544D-6F36ADD3B891}"/>
+          </ac:spMkLst>
+        </pc:spChg>
+        <pc:spChg chg="add mod">
+          <ac:chgData name="Arnamoy Bhattacharyya" userId="0970db85b6afed2b" providerId="LiveId" clId="{E0C0FC26-AC95-4CE0-9505-FF80D35904F0}" dt="2024-05-08T13:52:30.115" v="304" actId="20577"/>
+          <ac:spMkLst>
+            <pc:docMk/>
+            <pc:sldMk cId="932916590" sldId="266"/>
+            <ac:spMk id="4" creationId="{0539A5E5-AEC6-4981-F479-C59A1365732C}"/>
+          </ac:spMkLst>
+        </pc:spChg>
+      </pc:sldChg>
+      <pc:sldChg chg="addSp delSp modSp mod">
+        <pc:chgData name="Arnamoy Bhattacharyya" userId="0970db85b6afed2b" providerId="LiveId" clId="{E0C0FC26-AC95-4CE0-9505-FF80D35904F0}" dt="2024-05-10T11:50:33.750" v="314" actId="20577"/>
+        <pc:sldMkLst>
+          <pc:docMk/>
+          <pc:sldMk cId="383284418" sldId="267"/>
+        </pc:sldMkLst>
+        <pc:spChg chg="mod">
+          <ac:chgData name="Arnamoy Bhattacharyya" userId="0970db85b6afed2b" providerId="LiveId" clId="{E0C0FC26-AC95-4CE0-9505-FF80D35904F0}" dt="2024-05-10T11:50:33.750" v="314" actId="20577"/>
+          <ac:spMkLst>
+            <pc:docMk/>
+            <pc:sldMk cId="383284418" sldId="267"/>
+            <ac:spMk id="2" creationId="{3B66668E-BACC-F214-E009-B8B489BCE7EE}"/>
+          </ac:spMkLst>
+        </pc:spChg>
+        <pc:spChg chg="mod">
+          <ac:chgData name="Arnamoy Bhattacharyya" userId="0970db85b6afed2b" providerId="LiveId" clId="{E0C0FC26-AC95-4CE0-9505-FF80D35904F0}" dt="2024-05-08T14:04:16.514" v="307" actId="5793"/>
+          <ac:spMkLst>
+            <pc:docMk/>
+            <pc:sldMk cId="383284418" sldId="267"/>
+            <ac:spMk id="3" creationId="{09DE02AB-93CF-4CD9-D53A-E4BAE822AA44}"/>
+          </ac:spMkLst>
+        </pc:spChg>
+        <pc:picChg chg="del">
+          <ac:chgData name="Arnamoy Bhattacharyya" userId="0970db85b6afed2b" providerId="LiveId" clId="{E0C0FC26-AC95-4CE0-9505-FF80D35904F0}" dt="2024-05-08T14:04:12.381" v="305" actId="478"/>
+          <ac:picMkLst>
+            <pc:docMk/>
+            <pc:sldMk cId="383284418" sldId="267"/>
+            <ac:picMk id="4" creationId="{4FB7CCA2-6834-9C9F-CB42-E3D8D6F91391}"/>
+          </ac:picMkLst>
+        </pc:picChg>
+        <pc:picChg chg="del">
+          <ac:chgData name="Arnamoy Bhattacharyya" userId="0970db85b6afed2b" providerId="LiveId" clId="{E0C0FC26-AC95-4CE0-9505-FF80D35904F0}" dt="2024-05-08T14:04:19.196" v="308" actId="478"/>
+          <ac:picMkLst>
+            <pc:docMk/>
+            <pc:sldMk cId="383284418" sldId="267"/>
+            <ac:picMk id="5" creationId="{1498D1F2-B0CE-F536-5EEF-C217A2453ED8}"/>
+          </ac:picMkLst>
+        </pc:picChg>
+        <pc:picChg chg="add mod">
+          <ac:chgData name="Arnamoy Bhattacharyya" userId="0970db85b6afed2b" providerId="LiveId" clId="{E0C0FC26-AC95-4CE0-9505-FF80D35904F0}" dt="2024-05-08T14:04:28.563" v="311" actId="1076"/>
+          <ac:picMkLst>
+            <pc:docMk/>
+            <pc:sldMk cId="383284418" sldId="267"/>
+            <ac:picMk id="7" creationId="{C3E85B8C-B64D-EB9F-7C96-FA90E22BDED0}"/>
+          </ac:picMkLst>
+        </pc:picChg>
+      </pc:sldChg>
+      <pc:sldChg chg="modSp mod">
+        <pc:chgData name="Arnamoy Bhattacharyya" userId="0970db85b6afed2b" providerId="LiveId" clId="{E0C0FC26-AC95-4CE0-9505-FF80D35904F0}" dt="2024-05-10T11:51:15.250" v="419" actId="20577"/>
+        <pc:sldMkLst>
+          <pc:docMk/>
+          <pc:sldMk cId="2217120696" sldId="269"/>
+        </pc:sldMkLst>
+        <pc:spChg chg="mod">
+          <ac:chgData name="Arnamoy Bhattacharyya" userId="0970db85b6afed2b" providerId="LiveId" clId="{E0C0FC26-AC95-4CE0-9505-FF80D35904F0}" dt="2024-05-10T11:51:15.250" v="419" actId="20577"/>
+          <ac:spMkLst>
+            <pc:docMk/>
+            <pc:sldMk cId="2217120696" sldId="269"/>
+            <ac:spMk id="3" creationId="{9C2001A3-9107-3FAA-A015-D6B428D1A240}"/>
+          </ac:spMkLst>
+        </pc:spChg>
+      </pc:sldChg>
+      <pc:sldChg chg="del">
+        <pc:chgData name="Arnamoy Bhattacharyya" userId="0970db85b6afed2b" providerId="LiveId" clId="{E0C0FC26-AC95-4CE0-9505-FF80D35904F0}" dt="2024-05-08T14:04:36.495" v="312" actId="47"/>
+        <pc:sldMkLst>
+          <pc:docMk/>
+          <pc:sldMk cId="2620433003" sldId="270"/>
+        </pc:sldMkLst>
+      </pc:sldChg>
+    </pc:docChg>
+  </pc:docChgLst>
+</pc:chgInfo>
 </file>
 
 <file path=ppt/notesMasters/notesMaster1.xml><?xml version="1.0" encoding="utf-8"?>
@@ -221,7 +347,7 @@
           </a:lstStyle>
           <a:p>
             <a:fld id="{B6BB2297-AD11-4BF0-8CDE-C85115FF82B3}" type="datetimeFigureOut">
-              <a:t>1/9/2024</a:t>
+              <a:t>5/10/2024</a:t>
             </a:fld>
             <a:endParaRPr lang="en-GB"/>
           </a:p>
@@ -836,7 +962,7 @@
           <a:p>
             <a:fld id="{846CE7D5-CF57-46EF-B807-FDD0502418D4}" type="datetimeFigureOut">
               <a:rPr lang="en-US" smtClean="0"/>
-              <a:t>1/9/2024</a:t>
+              <a:t>5/10/2024</a:t>
             </a:fld>
             <a:endParaRPr lang="en-US"/>
           </a:p>
@@ -1006,7 +1132,7 @@
           <a:p>
             <a:fld id="{846CE7D5-CF57-46EF-B807-FDD0502418D4}" type="datetimeFigureOut">
               <a:rPr lang="en-US" smtClean="0"/>
-              <a:t>1/9/2024</a:t>
+              <a:t>5/10/2024</a:t>
             </a:fld>
             <a:endParaRPr lang="en-US"/>
           </a:p>
@@ -1186,7 +1312,7 @@
           <a:p>
             <a:fld id="{846CE7D5-CF57-46EF-B807-FDD0502418D4}" type="datetimeFigureOut">
               <a:rPr lang="en-US" smtClean="0"/>
-              <a:t>1/9/2024</a:t>
+              <a:t>5/10/2024</a:t>
             </a:fld>
             <a:endParaRPr lang="en-US"/>
           </a:p>
@@ -1356,7 +1482,7 @@
           <a:p>
             <a:fld id="{846CE7D5-CF57-46EF-B807-FDD0502418D4}" type="datetimeFigureOut">
               <a:rPr lang="en-US" smtClean="0"/>
-              <a:t>1/9/2024</a:t>
+              <a:t>5/10/2024</a:t>
             </a:fld>
             <a:endParaRPr lang="en-US"/>
           </a:p>
@@ -1602,7 +1728,7 @@
           <a:p>
             <a:fld id="{846CE7D5-CF57-46EF-B807-FDD0502418D4}" type="datetimeFigureOut">
               <a:rPr lang="en-US" smtClean="0"/>
-              <a:t>1/9/2024</a:t>
+              <a:t>5/10/2024</a:t>
             </a:fld>
             <a:endParaRPr lang="en-US"/>
           </a:p>
@@ -1834,7 +1960,7 @@
           <a:p>
             <a:fld id="{846CE7D5-CF57-46EF-B807-FDD0502418D4}" type="datetimeFigureOut">
               <a:rPr lang="en-US" smtClean="0"/>
-              <a:t>1/9/2024</a:t>
+              <a:t>5/10/2024</a:t>
             </a:fld>
             <a:endParaRPr lang="en-US"/>
           </a:p>
@@ -2201,7 +2327,7 @@
           <a:p>
             <a:fld id="{846CE7D5-CF57-46EF-B807-FDD0502418D4}" type="datetimeFigureOut">
               <a:rPr lang="en-US" smtClean="0"/>
-              <a:t>1/9/2024</a:t>
+              <a:t>5/10/2024</a:t>
             </a:fld>
             <a:endParaRPr lang="en-US"/>
           </a:p>
@@ -2319,7 +2445,7 @@
           <a:p>
             <a:fld id="{846CE7D5-CF57-46EF-B807-FDD0502418D4}" type="datetimeFigureOut">
               <a:rPr lang="en-US" smtClean="0"/>
-              <a:t>1/9/2024</a:t>
+              <a:t>5/10/2024</a:t>
             </a:fld>
             <a:endParaRPr lang="en-US"/>
           </a:p>
@@ -2414,7 +2540,7 @@
           <a:p>
             <a:fld id="{846CE7D5-CF57-46EF-B807-FDD0502418D4}" type="datetimeFigureOut">
               <a:rPr lang="en-US" smtClean="0"/>
-              <a:t>1/9/2024</a:t>
+              <a:t>5/10/2024</a:t>
             </a:fld>
             <a:endParaRPr lang="en-US"/>
           </a:p>
@@ -2691,7 +2817,7 @@
           <a:p>
             <a:fld id="{846CE7D5-CF57-46EF-B807-FDD0502418D4}" type="datetimeFigureOut">
               <a:rPr lang="en-US" smtClean="0"/>
-              <a:t>1/9/2024</a:t>
+              <a:t>5/10/2024</a:t>
             </a:fld>
             <a:endParaRPr lang="en-US"/>
           </a:p>
@@ -2948,7 +3074,7 @@
           <a:p>
             <a:fld id="{846CE7D5-CF57-46EF-B807-FDD0502418D4}" type="datetimeFigureOut">
               <a:rPr lang="en-US" smtClean="0"/>
-              <a:t>1/9/2024</a:t>
+              <a:t>5/10/2024</a:t>
             </a:fld>
             <a:endParaRPr lang="en-US"/>
           </a:p>
@@ -3161,7 +3287,7 @@
           <a:p>
             <a:fld id="{846CE7D5-CF57-46EF-B807-FDD0502418D4}" type="datetimeFigureOut">
               <a:rPr lang="en-US" smtClean="0"/>
-              <a:t>1/9/2024</a:t>
+              <a:t>5/10/2024</a:t>
             </a:fld>
             <a:endParaRPr lang="en-US"/>
           </a:p>
@@ -3592,7 +3718,7 @@
                 <a:ea typeface="Calibri Light"/>
                 <a:cs typeface="Calibri Light"/>
               </a:rPr>
-              <a:t>OOP244_NHH</a:t>
+              <a:t>OOP244_NDD</a:t>
             </a:r>
             <a:endParaRPr lang="en-GB" dirty="0"/>
           </a:p>
@@ -4318,7 +4444,7 @@
               <a:rPr lang="en-GB" dirty="0">
                 <a:cs typeface="Calibri Light"/>
               </a:rPr>
-              <a:t>Namespace example coding</a:t>
+              <a:t>Namespace</a:t>
             </a:r>
             <a:endParaRPr lang="en-GB" dirty="0"/>
           </a:p>
@@ -4340,12 +4466,305 @@
             <p:ph idx="1"/>
           </p:nvPr>
         </p:nvSpPr>
-        <p:spPr/>
+        <p:spPr>
+          <a:xfrm>
+            <a:off x="838200" y="1825625"/>
+            <a:ext cx="10515600" cy="1069975"/>
+          </a:xfrm>
+        </p:spPr>
         <p:txBody>
           <a:bodyPr/>
           <a:lstStyle/>
           <a:p>
-            <a:endParaRPr lang="en-GB"/>
+            <a:r>
+              <a:rPr lang="en-US" b="0" i="0" dirty="0">
+                <a:solidFill>
+                  <a:srgbClr val="1C1E21"/>
+                </a:solidFill>
+                <a:effectLst/>
+                <a:latin typeface="system-ui"/>
+              </a:rPr>
+              <a:t>A namespace is a </a:t>
+            </a:r>
+            <a:r>
+              <a:rPr lang="en-US" b="1" i="0" dirty="0">
+                <a:solidFill>
+                  <a:srgbClr val="1C1E21"/>
+                </a:solidFill>
+                <a:effectLst/>
+                <a:latin typeface="system-ui"/>
+              </a:rPr>
+              <a:t>scope</a:t>
+            </a:r>
+            <a:r>
+              <a:rPr lang="en-US" b="0" i="0" dirty="0">
+                <a:solidFill>
+                  <a:srgbClr val="1C1E21"/>
+                </a:solidFill>
+                <a:effectLst/>
+                <a:latin typeface="system-ui"/>
+              </a:rPr>
+              <a:t> for the entities that it encloses. </a:t>
+            </a:r>
+          </a:p>
+          <a:p>
+            <a:r>
+              <a:rPr lang="en-US" b="0" i="0" dirty="0">
+                <a:solidFill>
+                  <a:srgbClr val="1C1E21"/>
+                </a:solidFill>
+                <a:effectLst/>
+                <a:latin typeface="system-ui"/>
+              </a:rPr>
+              <a:t>Scoping rules avoid identifier conflicts across different namespaces.</a:t>
+            </a:r>
+            <a:endParaRPr lang="en-GB" dirty="0"/>
+          </a:p>
+        </p:txBody>
+      </p:sp>
+      <p:sp>
+        <p:nvSpPr>
+          <p:cNvPr id="4" name="TextBox 3">
+            <a:extLst>
+              <a:ext uri="{FF2B5EF4-FFF2-40B4-BE49-F238E27FC236}">
+                <a16:creationId xmlns:a16="http://schemas.microsoft.com/office/drawing/2014/main" id="{0539A5E5-AEC6-4981-F479-C59A1365732C}"/>
+              </a:ext>
+            </a:extLst>
+          </p:cNvPr>
+          <p:cNvSpPr txBox="1"/>
+          <p:nvPr/>
+        </p:nvSpPr>
+        <p:spPr>
+          <a:xfrm>
+            <a:off x="1240971" y="3243943"/>
+            <a:ext cx="9307286" cy="2308324"/>
+          </a:xfrm>
+          <a:prstGeom prst="rect">
+            <a:avLst/>
+          </a:prstGeom>
+          <a:noFill/>
+        </p:spPr>
+        <p:txBody>
+          <a:bodyPr wrap="square" rtlCol="0">
+            <a:spAutoFit/>
+          </a:bodyPr>
+          <a:lstStyle/>
+          <a:p>
+            <a:r>
+              <a:rPr lang="en-US" b="0" i="0" dirty="0">
+                <a:solidFill>
+                  <a:srgbClr val="00009F"/>
+                </a:solidFill>
+                <a:effectLst/>
+                <a:highlight>
+                  <a:srgbClr val="F6F8FA"/>
+                </a:highlight>
+                <a:latin typeface="SFMono-Regular"/>
+              </a:rPr>
+              <a:t>namespace</a:t>
+            </a:r>
+            <a:r>
+              <a:rPr lang="en-US" b="0" i="0" dirty="0">
+                <a:solidFill>
+                  <a:srgbClr val="393A34"/>
+                </a:solidFill>
+                <a:effectLst/>
+                <a:highlight>
+                  <a:srgbClr val="F6F8FA"/>
+                </a:highlight>
+                <a:latin typeface="SFMono-Regular"/>
+              </a:rPr>
+              <a:t> Tom { 					int main() {</a:t>
+            </a:r>
+            <a:br>
+              <a:rPr lang="en-US" b="0" i="0" dirty="0">
+                <a:solidFill>
+                  <a:srgbClr val="393A34"/>
+                </a:solidFill>
+                <a:effectLst/>
+                <a:highlight>
+                  <a:srgbClr val="F6F8FA"/>
+                </a:highlight>
+                <a:latin typeface="SFMono-Regular"/>
+              </a:rPr>
+            </a:br>
+            <a:r>
+              <a:rPr lang="en-US" b="0" i="0" dirty="0">
+                <a:solidFill>
+                  <a:srgbClr val="393A34"/>
+                </a:solidFill>
+                <a:effectLst/>
+                <a:highlight>
+                  <a:srgbClr val="F6F8FA"/>
+                </a:highlight>
+                <a:latin typeface="SFMono-Regular"/>
+              </a:rPr>
+              <a:t>   </a:t>
+            </a:r>
+            <a:r>
+              <a:rPr lang="en-US" dirty="0">
+                <a:solidFill>
+                  <a:srgbClr val="00009F"/>
+                </a:solidFill>
+                <a:highlight>
+                  <a:srgbClr val="F6F8FA"/>
+                </a:highlight>
+                <a:latin typeface="SFMono-Regular"/>
+              </a:rPr>
+              <a:t>void foo();                                                       			Tom::foo();</a:t>
+            </a:r>
+            <a:br>
+              <a:rPr lang="en-US" b="0" i="0" dirty="0">
+                <a:solidFill>
+                  <a:srgbClr val="393A34"/>
+                </a:solidFill>
+                <a:effectLst/>
+                <a:highlight>
+                  <a:srgbClr val="F6F8FA"/>
+                </a:highlight>
+                <a:latin typeface="SFMono-Regular"/>
+              </a:rPr>
+            </a:br>
+            <a:r>
+              <a:rPr lang="en-US" b="0" i="0" dirty="0">
+                <a:solidFill>
+                  <a:srgbClr val="393A34"/>
+                </a:solidFill>
+                <a:effectLst/>
+                <a:highlight>
+                  <a:srgbClr val="F6F8FA"/>
+                </a:highlight>
+                <a:latin typeface="SFMono-Regular"/>
+              </a:rPr>
+              <a:t>}							Dick::Foo();</a:t>
+            </a:r>
+            <a:br>
+              <a:rPr lang="en-US" b="0" i="0" dirty="0">
+                <a:solidFill>
+                  <a:srgbClr val="393A34"/>
+                </a:solidFill>
+                <a:effectLst/>
+                <a:highlight>
+                  <a:srgbClr val="F6F8FA"/>
+                </a:highlight>
+                <a:latin typeface="SFMono-Regular"/>
+              </a:rPr>
+            </a:br>
+            <a:r>
+              <a:rPr lang="en-US" b="0" i="0" dirty="0">
+                <a:solidFill>
+                  <a:srgbClr val="393A34"/>
+                </a:solidFill>
+                <a:effectLst/>
+                <a:highlight>
+                  <a:srgbClr val="F6F8FA"/>
+                </a:highlight>
+                <a:latin typeface="SFMono-Regular"/>
+              </a:rPr>
+              <a:t>						}</a:t>
+            </a:r>
+          </a:p>
+          <a:p>
+            <a:r>
+              <a:rPr lang="en-US" dirty="0">
+                <a:solidFill>
+                  <a:srgbClr val="393A34"/>
+                </a:solidFill>
+                <a:highlight>
+                  <a:srgbClr val="F6F8FA"/>
+                </a:highlight>
+                <a:latin typeface="SFMono-Regular"/>
+              </a:rPr>
+              <a:t>						using namespace Tom;</a:t>
+            </a:r>
+            <a:br>
+              <a:rPr lang="en-US" b="0" i="0" dirty="0">
+                <a:solidFill>
+                  <a:srgbClr val="393A34"/>
+                </a:solidFill>
+                <a:effectLst/>
+                <a:highlight>
+                  <a:srgbClr val="F6F8FA"/>
+                </a:highlight>
+                <a:latin typeface="SFMono-Regular"/>
+              </a:rPr>
+            </a:br>
+            <a:r>
+              <a:rPr lang="en-US" b="0" i="0" dirty="0">
+                <a:solidFill>
+                  <a:srgbClr val="00009F"/>
+                </a:solidFill>
+                <a:effectLst/>
+                <a:highlight>
+                  <a:srgbClr val="F6F8FA"/>
+                </a:highlight>
+                <a:latin typeface="SFMono-Regular"/>
+              </a:rPr>
+              <a:t>namespace</a:t>
+            </a:r>
+            <a:r>
+              <a:rPr lang="en-US" b="0" i="0" dirty="0">
+                <a:solidFill>
+                  <a:srgbClr val="393A34"/>
+                </a:solidFill>
+                <a:effectLst/>
+                <a:highlight>
+                  <a:srgbClr val="F6F8FA"/>
+                </a:highlight>
+                <a:latin typeface="SFMono-Regular"/>
+              </a:rPr>
+              <a:t> Dick {					int main() {</a:t>
+            </a:r>
+            <a:br>
+              <a:rPr lang="en-US" b="0" i="0" dirty="0">
+                <a:solidFill>
+                  <a:srgbClr val="393A34"/>
+                </a:solidFill>
+                <a:effectLst/>
+                <a:highlight>
+                  <a:srgbClr val="F6F8FA"/>
+                </a:highlight>
+                <a:latin typeface="SFMono-Regular"/>
+              </a:rPr>
+            </a:br>
+            <a:r>
+              <a:rPr lang="en-US" dirty="0">
+                <a:solidFill>
+                  <a:srgbClr val="00009F"/>
+                </a:solidFill>
+                <a:highlight>
+                  <a:srgbClr val="F6F8FA"/>
+                </a:highlight>
+                <a:latin typeface="SFMono-Regular"/>
+              </a:rPr>
+              <a:t>   void foo();						foo();</a:t>
+            </a:r>
+            <a:br>
+              <a:rPr lang="en-US" b="0" i="0" dirty="0">
+                <a:solidFill>
+                  <a:srgbClr val="393A34"/>
+                </a:solidFill>
+                <a:effectLst/>
+                <a:highlight>
+                  <a:srgbClr val="F6F8FA"/>
+                </a:highlight>
+                <a:latin typeface="SFMono-Regular"/>
+              </a:rPr>
+            </a:br>
+            <a:r>
+              <a:rPr lang="en-US" b="0" i="0" dirty="0">
+                <a:solidFill>
+                  <a:srgbClr val="393A34"/>
+                </a:solidFill>
+                <a:effectLst/>
+                <a:highlight>
+                  <a:srgbClr val="F6F8FA"/>
+                </a:highlight>
+                <a:latin typeface="SFMono-Regular"/>
+              </a:rPr>
+              <a:t>}						}</a:t>
+            </a:r>
+            <a:endParaRPr lang="en-US" dirty="0"/>
           </a:p>
         </p:txBody>
       </p:sp>
@@ -4954,7 +5373,7 @@
               <a:rPr lang="en-GB" dirty="0">
                 <a:cs typeface="Calibri Light"/>
               </a:rPr>
-              <a:t>Inheritance: Exercise</a:t>
+              <a:t>Inheritance</a:t>
             </a:r>
           </a:p>
         </p:txBody>
@@ -4982,14 +5401,6 @@
           </a:bodyPr>
           <a:lstStyle/>
           <a:p>
-            <a:r>
-              <a:rPr lang="en-GB" dirty="0">
-                <a:cs typeface="Calibri"/>
-              </a:rPr>
-              <a:t>Create a Square class, which has two members width and height, and a method for printing the width and height of the square:</a:t>
-            </a:r>
-          </a:p>
-          <a:p>
             <a:pPr marL="0" indent="0">
               <a:buNone/>
             </a:pPr>
@@ -5005,14 +5416,22 @@
               <a:cs typeface="Calibri"/>
             </a:endParaRPr>
           </a:p>
+          <a:p>
+            <a:pPr marL="0" indent="0">
+              <a:buNone/>
+            </a:pPr>
+            <a:endParaRPr lang="en-GB" dirty="0">
+              <a:cs typeface="Calibri"/>
+            </a:endParaRPr>
+          </a:p>
         </p:txBody>
       </p:sp>
       <p:pic>
         <p:nvPicPr>
-          <p:cNvPr id="4" name="Picture 3" descr="Square Picture - Images of Shapes">
+          <p:cNvPr id="7" name="Picture 6">
             <a:extLst>
               <a:ext uri="{FF2B5EF4-FFF2-40B4-BE49-F238E27FC236}">
-                <a16:creationId xmlns:a16="http://schemas.microsoft.com/office/drawing/2014/main" id="{4FB7CCA2-6834-9C9F-CB42-E3D8D6F91391}"/>
+                <a16:creationId xmlns:a16="http://schemas.microsoft.com/office/drawing/2014/main" id="{C3E85B8C-B64D-EB9F-7C96-FA90E22BDED0}"/>
               </a:ext>
             </a:extLst>
           </p:cNvPr>
@@ -5029,38 +5448,8 @@
         </p:blipFill>
         <p:spPr>
           <a:xfrm>
-            <a:off x="10260033" y="2377786"/>
-            <a:ext cx="1409700" cy="1409700"/>
-          </a:xfrm>
-          <a:prstGeom prst="rect">
-            <a:avLst/>
-          </a:prstGeom>
-        </p:spPr>
-      </p:pic>
-      <p:pic>
-        <p:nvPicPr>
-          <p:cNvPr id="5" name="Picture 4" descr="A computer screen shot of a program code&#10;&#10;Description automatically generated">
-            <a:extLst>
-              <a:ext uri="{FF2B5EF4-FFF2-40B4-BE49-F238E27FC236}">
-                <a16:creationId xmlns:a16="http://schemas.microsoft.com/office/drawing/2014/main" id="{1498D1F2-B0CE-F536-5EEF-C217A2453ED8}"/>
-              </a:ext>
-            </a:extLst>
-          </p:cNvPr>
-          <p:cNvPicPr>
-            <a:picLocks noChangeAspect="1"/>
-          </p:cNvPicPr>
-          <p:nvPr/>
-        </p:nvPicPr>
-        <p:blipFill>
-          <a:blip r:embed="rId3"/>
-          <a:stretch>
-            <a:fillRect/>
-          </a:stretch>
-        </p:blipFill>
-        <p:spPr>
-          <a:xfrm>
-            <a:off x="1015464" y="2768806"/>
-            <a:ext cx="6242215" cy="3824102"/>
+            <a:off x="1328057" y="1825625"/>
+            <a:ext cx="9535886" cy="4563652"/>
           </a:xfrm>
           <a:prstGeom prst="rect">
             <a:avLst/>
@@ -5102,92 +5491,6 @@
           <p:cNvPr id="2" name="Title 1">
             <a:extLst>
               <a:ext uri="{FF2B5EF4-FFF2-40B4-BE49-F238E27FC236}">
-                <a16:creationId xmlns:a16="http://schemas.microsoft.com/office/drawing/2014/main" id="{F72209E4-3654-3C60-BA1F-DF493FA8C110}"/>
-              </a:ext>
-            </a:extLst>
-          </p:cNvPr>
-          <p:cNvSpPr>
-            <a:spLocks noGrp="1"/>
-          </p:cNvSpPr>
-          <p:nvPr>
-            <p:ph type="title"/>
-          </p:nvPr>
-        </p:nvSpPr>
-        <p:spPr/>
-        <p:txBody>
-          <a:bodyPr/>
-          <a:lstStyle/>
-          <a:p>
-            <a:r>
-              <a:rPr lang="en-GB" dirty="0">
-                <a:cs typeface="Calibri Light"/>
-              </a:rPr>
-              <a:t>Inheritance: Coding</a:t>
-            </a:r>
-            <a:endParaRPr lang="en-GB" dirty="0"/>
-          </a:p>
-        </p:txBody>
-      </p:sp>
-      <p:sp>
-        <p:nvSpPr>
-          <p:cNvPr id="3" name="Content Placeholder 2">
-            <a:extLst>
-              <a:ext uri="{FF2B5EF4-FFF2-40B4-BE49-F238E27FC236}">
-                <a16:creationId xmlns:a16="http://schemas.microsoft.com/office/drawing/2014/main" id="{2D96CA74-5B06-71D3-5003-5C7052E1AD85}"/>
-              </a:ext>
-            </a:extLst>
-          </p:cNvPr>
-          <p:cNvSpPr>
-            <a:spLocks noGrp="1"/>
-          </p:cNvSpPr>
-          <p:nvPr>
-            <p:ph idx="1"/>
-          </p:nvPr>
-        </p:nvSpPr>
-        <p:spPr/>
-        <p:txBody>
-          <a:bodyPr/>
-          <a:lstStyle/>
-          <a:p>
-            <a:endParaRPr lang="en-GB"/>
-          </a:p>
-        </p:txBody>
-      </p:sp>
-    </p:spTree>
-    <p:extLst>
-      <p:ext uri="{BB962C8B-B14F-4D97-AF65-F5344CB8AC3E}">
-        <p14:creationId xmlns:p14="http://schemas.microsoft.com/office/powerpoint/2010/main" val="2620433003"/>
-      </p:ext>
-    </p:extLst>
-  </p:cSld>
-  <p:clrMapOvr>
-    <a:masterClrMapping/>
-  </p:clrMapOvr>
-</p:sld>
-</file>
-
-<file path=ppt/slides/slide16.xml><?xml version="1.0" encoding="utf-8"?>
-<p:sld xmlns:a="http://schemas.openxmlformats.org/drawingml/2006/main" xmlns:r="http://schemas.openxmlformats.org/officeDocument/2006/relationships" xmlns:p="http://schemas.openxmlformats.org/presentationml/2006/main">
-  <p:cSld>
-    <p:spTree>
-      <p:nvGrpSpPr>
-        <p:cNvPr id="1" name=""/>
-        <p:cNvGrpSpPr/>
-        <p:nvPr/>
-      </p:nvGrpSpPr>
-      <p:grpSpPr>
-        <a:xfrm>
-          <a:off x="0" y="0"/>
-          <a:ext cx="0" cy="0"/>
-          <a:chOff x="0" y="0"/>
-          <a:chExt cx="0" cy="0"/>
-        </a:xfrm>
-      </p:grpSpPr>
-      <p:sp>
-        <p:nvSpPr>
-          <p:cNvPr id="2" name="Title 1">
-            <a:extLst>
-              <a:ext uri="{FF2B5EF4-FFF2-40B4-BE49-F238E27FC236}">
                 <a16:creationId xmlns:a16="http://schemas.microsoft.com/office/drawing/2014/main" id="{3080758F-C2D6-D6DF-B2A6-4C59DBB2943C}"/>
               </a:ext>
             </a:extLst>
@@ -5241,27 +5544,15 @@
               <a:rPr lang="en-GB" dirty="0">
                 <a:cs typeface="Calibri"/>
               </a:rPr>
-              <a:t>What if we want to have the same function (</a:t>
-            </a:r>
-            <a:r>
-              <a:rPr lang="en-GB" err="1">
-                <a:cs typeface="Calibri"/>
-              </a:rPr>
-              <a:t>calculateArea</a:t>
-            </a:r>
-            <a:r>
-              <a:rPr lang="en-GB" dirty="0">
-                <a:cs typeface="Calibri"/>
-              </a:rPr>
-              <a:t>) in all the </a:t>
+              <a:t>The “same thing” does </a:t>
             </a:r>
             <a:r>
               <a:rPr lang="en-GB">
                 <a:cs typeface="Calibri"/>
               </a:rPr>
-              <a:t>derived classes, but each with their own logic?</a:t>
-            </a:r>
-            <a:endParaRPr lang="en-GB"/>
+              <a:t>different things based on the context</a:t>
+            </a:r>
+            <a:endParaRPr lang="en-GB" dirty="0"/>
           </a:p>
         </p:txBody>
       </p:sp>

</xml_diff>